<commit_message>
update README and added Wk 01
</commit_message>
<xml_diff>
--- a/docs/Wk-01/python-projects-wk-01.pptx
+++ b/docs/Wk-01/python-projects-wk-01.pptx
@@ -108,6 +108,11 @@
       </a:defRPr>
     </a:lvl9pPr>
   </p:defaultTextStyle>
+  <p:extLst>
+    <p:ext uri="{EFAFB233-063F-42B5-8137-9DF3F51BA10A}">
+      <p15:sldGuideLst xmlns:p15="http://schemas.microsoft.com/office/powerpoint/2012/main"/>
+    </p:ext>
+  </p:extLst>
 </p:presentation>
 </file>
 
@@ -260,7 +265,7 @@
           <a:p>
             <a:fld id="{E229A437-BF6D-4C8C-98EC-26B84C2F5A83}" type="datetimeFigureOut">
               <a:rPr lang="en-GB" smtClean="0"/>
-              <a:t>14/05/2020</a:t>
+              <a:t>15/05/2020</a:t>
             </a:fld>
             <a:endParaRPr lang="en-GB"/>
           </a:p>
@@ -460,7 +465,7 @@
           <a:p>
             <a:fld id="{E229A437-BF6D-4C8C-98EC-26B84C2F5A83}" type="datetimeFigureOut">
               <a:rPr lang="en-GB" smtClean="0"/>
-              <a:t>14/05/2020</a:t>
+              <a:t>15/05/2020</a:t>
             </a:fld>
             <a:endParaRPr lang="en-GB"/>
           </a:p>
@@ -670,7 +675,7 @@
           <a:p>
             <a:fld id="{E229A437-BF6D-4C8C-98EC-26B84C2F5A83}" type="datetimeFigureOut">
               <a:rPr lang="en-GB" smtClean="0"/>
-              <a:t>14/05/2020</a:t>
+              <a:t>15/05/2020</a:t>
             </a:fld>
             <a:endParaRPr lang="en-GB"/>
           </a:p>
@@ -870,7 +875,7 @@
           <a:p>
             <a:fld id="{E229A437-BF6D-4C8C-98EC-26B84C2F5A83}" type="datetimeFigureOut">
               <a:rPr lang="en-GB" smtClean="0"/>
-              <a:t>14/05/2020</a:t>
+              <a:t>15/05/2020</a:t>
             </a:fld>
             <a:endParaRPr lang="en-GB"/>
           </a:p>
@@ -1146,7 +1151,7 @@
           <a:p>
             <a:fld id="{E229A437-BF6D-4C8C-98EC-26B84C2F5A83}" type="datetimeFigureOut">
               <a:rPr lang="en-GB" smtClean="0"/>
-              <a:t>14/05/2020</a:t>
+              <a:t>15/05/2020</a:t>
             </a:fld>
             <a:endParaRPr lang="en-GB"/>
           </a:p>
@@ -1414,7 +1419,7 @@
           <a:p>
             <a:fld id="{E229A437-BF6D-4C8C-98EC-26B84C2F5A83}" type="datetimeFigureOut">
               <a:rPr lang="en-GB" smtClean="0"/>
-              <a:t>14/05/2020</a:t>
+              <a:t>15/05/2020</a:t>
             </a:fld>
             <a:endParaRPr lang="en-GB"/>
           </a:p>
@@ -1829,7 +1834,7 @@
           <a:p>
             <a:fld id="{E229A437-BF6D-4C8C-98EC-26B84C2F5A83}" type="datetimeFigureOut">
               <a:rPr lang="en-GB" smtClean="0"/>
-              <a:t>14/05/2020</a:t>
+              <a:t>15/05/2020</a:t>
             </a:fld>
             <a:endParaRPr lang="en-GB"/>
           </a:p>
@@ -1971,7 +1976,7 @@
           <a:p>
             <a:fld id="{E229A437-BF6D-4C8C-98EC-26B84C2F5A83}" type="datetimeFigureOut">
               <a:rPr lang="en-GB" smtClean="0"/>
-              <a:t>14/05/2020</a:t>
+              <a:t>15/05/2020</a:t>
             </a:fld>
             <a:endParaRPr lang="en-GB"/>
           </a:p>
@@ -2084,7 +2089,7 @@
           <a:p>
             <a:fld id="{E229A437-BF6D-4C8C-98EC-26B84C2F5A83}" type="datetimeFigureOut">
               <a:rPr lang="en-GB" smtClean="0"/>
-              <a:t>14/05/2020</a:t>
+              <a:t>15/05/2020</a:t>
             </a:fld>
             <a:endParaRPr lang="en-GB"/>
           </a:p>
@@ -2397,7 +2402,7 @@
           <a:p>
             <a:fld id="{E229A437-BF6D-4C8C-98EC-26B84C2F5A83}" type="datetimeFigureOut">
               <a:rPr lang="en-GB" smtClean="0"/>
-              <a:t>14/05/2020</a:t>
+              <a:t>15/05/2020</a:t>
             </a:fld>
             <a:endParaRPr lang="en-GB"/>
           </a:p>
@@ -2686,7 +2691,7 @@
           <a:p>
             <a:fld id="{E229A437-BF6D-4C8C-98EC-26B84C2F5A83}" type="datetimeFigureOut">
               <a:rPr lang="en-GB" smtClean="0"/>
-              <a:t>14/05/2020</a:t>
+              <a:t>15/05/2020</a:t>
             </a:fld>
             <a:endParaRPr lang="en-GB"/>
           </a:p>
@@ -2929,7 +2934,7 @@
           <a:p>
             <a:fld id="{E229A437-BF6D-4C8C-98EC-26B84C2F5A83}" type="datetimeFigureOut">
               <a:rPr lang="en-GB" smtClean="0"/>
-              <a:t>14/05/2020</a:t>
+              <a:t>15/05/2020</a:t>
             </a:fld>
             <a:endParaRPr lang="en-GB"/>
           </a:p>
@@ -3758,12 +3763,107 @@
             <p:ph sz="half" idx="1"/>
           </p:nvPr>
         </p:nvSpPr>
-        <p:spPr/>
-        <p:txBody>
-          <a:bodyPr/>
-          <a:lstStyle/>
-          <a:p>
-            <a:endParaRPr lang="en-GB"/>
+        <p:spPr>
+          <a:xfrm>
+            <a:off x="838200" y="1825625"/>
+            <a:ext cx="5181600" cy="4474507"/>
+          </a:xfrm>
+        </p:spPr>
+        <p:txBody>
+          <a:bodyPr>
+            <a:normAutofit lnSpcReduction="10000"/>
+          </a:bodyPr>
+          <a:lstStyle/>
+          <a:p>
+            <a:r>
+              <a:rPr lang="en-GB" sz="2200" dirty="0"/>
+              <a:t>Why Python?</a:t>
+            </a:r>
+          </a:p>
+          <a:p>
+            <a:pPr lvl="1"/>
+            <a:r>
+              <a:rPr lang="en-GB" sz="1800" dirty="0"/>
+              <a:t>Many schools and universities use it to teach.</a:t>
+            </a:r>
+          </a:p>
+          <a:p>
+            <a:pPr lvl="1"/>
+            <a:r>
+              <a:rPr lang="en-GB" sz="1800" dirty="0"/>
+              <a:t>Easy to read and write</a:t>
+            </a:r>
+          </a:p>
+          <a:p>
+            <a:pPr lvl="2"/>
+            <a:r>
+              <a:rPr lang="en-GB" sz="1400" dirty="0"/>
+              <a:t>You write the instructions using a mixture of English words, punctuation, symbols &amp; numbers</a:t>
+            </a:r>
+          </a:p>
+          <a:p>
+            <a:pPr lvl="1"/>
+            <a:r>
+              <a:rPr lang="en-GB" sz="1800" dirty="0"/>
+              <a:t>Batteries included</a:t>
+            </a:r>
+          </a:p>
+          <a:p>
+            <a:pPr lvl="2"/>
+            <a:r>
+              <a:rPr lang="en-GB" sz="1400" dirty="0"/>
+              <a:t>It comes with everything you need to get coding straight away.</a:t>
+            </a:r>
+          </a:p>
+          <a:p>
+            <a:pPr lvl="1"/>
+            <a:r>
+              <a:rPr lang="en-GB" sz="1800" dirty="0"/>
+              <a:t>Handy tools</a:t>
+            </a:r>
+          </a:p>
+          <a:p>
+            <a:pPr lvl="2"/>
+            <a:r>
+              <a:rPr lang="en-GB" sz="1400" dirty="0"/>
+              <a:t>Is packed with lots of useful tools and code pre-packaged into libraries.</a:t>
+            </a:r>
+          </a:p>
+          <a:p>
+            <a:pPr lvl="1"/>
+            <a:r>
+              <a:rPr lang="en-GB" sz="1800" dirty="0"/>
+              <a:t>Works everywhere</a:t>
+            </a:r>
+          </a:p>
+          <a:p>
+            <a:pPr lvl="2"/>
+            <a:r>
+              <a:rPr lang="en-GB" sz="1400" dirty="0"/>
+              <a:t>You can write and run Python code on lots of different computers.</a:t>
+            </a:r>
+          </a:p>
+          <a:p>
+            <a:pPr lvl="1"/>
+            <a:r>
+              <a:rPr lang="en-GB" sz="1800" dirty="0"/>
+              <a:t>Great support</a:t>
+            </a:r>
+          </a:p>
+          <a:p>
+            <a:pPr lvl="2"/>
+            <a:r>
+              <a:rPr lang="en-GB" sz="1400" dirty="0"/>
+              <a:t>Python has well-written documentation, including a comprehensive reference section.</a:t>
+            </a:r>
+          </a:p>
+          <a:p>
+            <a:pPr lvl="1"/>
+            <a:endParaRPr lang="en-GB" sz="1800" dirty="0"/>
+          </a:p>
+          <a:p>
+            <a:pPr lvl="1"/>
+            <a:endParaRPr lang="en-GB" dirty="0"/>
           </a:p>
         </p:txBody>
       </p:sp>
@@ -3783,12 +3883,103 @@
             <p:ph sz="half" idx="2"/>
           </p:nvPr>
         </p:nvSpPr>
-        <p:spPr/>
-        <p:txBody>
-          <a:bodyPr/>
-          <a:lstStyle/>
-          <a:p>
-            <a:endParaRPr lang="en-GB"/>
+        <p:spPr>
+          <a:xfrm>
+            <a:off x="6172200" y="1825624"/>
+            <a:ext cx="5181600" cy="4776511"/>
+          </a:xfrm>
+        </p:spPr>
+        <p:txBody>
+          <a:bodyPr>
+            <a:normAutofit lnSpcReduction="10000"/>
+          </a:bodyPr>
+          <a:lstStyle/>
+          <a:p>
+            <a:r>
+              <a:rPr lang="en-GB" sz="2200" dirty="0"/>
+              <a:t>Python in action</a:t>
+            </a:r>
+          </a:p>
+          <a:p>
+            <a:pPr lvl="1"/>
+            <a:r>
+              <a:rPr lang="en-GB" sz="1600" dirty="0"/>
+              <a:t>Python is powerful to be used with interesting and exciting tasks within business, medicine and science.</a:t>
+            </a:r>
+          </a:p>
+          <a:p>
+            <a:pPr lvl="1"/>
+            <a:r>
+              <a:rPr lang="en-GB" sz="1800" dirty="0"/>
+              <a:t>Crawling the Web</a:t>
+            </a:r>
+          </a:p>
+          <a:p>
+            <a:pPr lvl="2"/>
+            <a:r>
+              <a:rPr lang="en-GB" sz="1400" dirty="0"/>
+              <a:t>Parts of Google’s search engine is written in Python. YouTube is also built using Python.</a:t>
+            </a:r>
+          </a:p>
+          <a:p>
+            <a:pPr lvl="1"/>
+            <a:r>
+              <a:rPr lang="en-GB" sz="1800" dirty="0"/>
+              <a:t>Medical marvels</a:t>
+            </a:r>
+          </a:p>
+          <a:p>
+            <a:pPr lvl="2"/>
+            <a:r>
+              <a:rPr lang="en-GB" sz="1400" dirty="0"/>
+              <a:t>A python-programmed robot can perform better, more accurate than a human</a:t>
+            </a:r>
+          </a:p>
+          <a:p>
+            <a:pPr lvl="1"/>
+            <a:r>
+              <a:rPr lang="en-GB" sz="1800" dirty="0"/>
+              <a:t>Serious business</a:t>
+            </a:r>
+          </a:p>
+          <a:p>
+            <a:pPr lvl="2"/>
+            <a:r>
+              <a:rPr lang="en-GB" sz="1400" dirty="0"/>
+              <a:t>Python is implemented into banks and big store chains to help manage financial aspects</a:t>
+            </a:r>
+          </a:p>
+          <a:p>
+            <a:pPr lvl="1"/>
+            <a:r>
+              <a:rPr lang="en-GB" sz="1800" dirty="0"/>
+              <a:t>Out of this world</a:t>
+            </a:r>
+          </a:p>
+          <a:p>
+            <a:pPr lvl="2"/>
+            <a:r>
+              <a:rPr lang="en-GB" sz="1400" dirty="0"/>
+              <a:t>Software engineers use Python to create tools for NASA’s Mission control</a:t>
+            </a:r>
+          </a:p>
+          <a:p>
+            <a:pPr lvl="1"/>
+            <a:r>
+              <a:rPr lang="en-GB" sz="1800" dirty="0"/>
+              <a:t>In the movies</a:t>
+            </a:r>
+          </a:p>
+          <a:p>
+            <a:pPr lvl="2"/>
+            <a:r>
+              <a:rPr lang="en-GB" sz="1400" dirty="0"/>
+              <a:t>Disney uses Python to automate repetitive parts of animation process</a:t>
+            </a:r>
+          </a:p>
+          <a:p>
+            <a:pPr lvl="1"/>
+            <a:endParaRPr lang="en-GB" sz="1800" dirty="0"/>
           </a:p>
         </p:txBody>
       </p:sp>
@@ -3868,10 +4059,114 @@
         </p:nvSpPr>
         <p:spPr/>
         <p:txBody>
-          <a:bodyPr/>
-          <a:lstStyle/>
-          <a:p>
-            <a:endParaRPr lang="en-GB"/>
+          <a:bodyPr>
+            <a:normAutofit/>
+          </a:bodyPr>
+          <a:lstStyle/>
+          <a:p>
+            <a:r>
+              <a:rPr lang="en-GB" sz="1800" dirty="0"/>
+              <a:t>Before you install Python -</a:t>
+            </a:r>
+          </a:p>
+          <a:p>
+            <a:pPr lvl="1"/>
+            <a:r>
+              <a:rPr lang="en-GB" sz="1400" dirty="0"/>
+              <a:t>Click “Start”</a:t>
+            </a:r>
+          </a:p>
+          <a:p>
+            <a:pPr lvl="1"/>
+            <a:r>
+              <a:rPr lang="en-GB" sz="1400" dirty="0"/>
+              <a:t>Right-click “Computer”</a:t>
+            </a:r>
+          </a:p>
+          <a:p>
+            <a:pPr lvl="1"/>
+            <a:r>
+              <a:rPr lang="en-GB" sz="1400" dirty="0"/>
+              <a:t>Left click “Properties”</a:t>
+            </a:r>
+          </a:p>
+          <a:p>
+            <a:pPr lvl="1"/>
+            <a:r>
+              <a:rPr lang="en-GB" sz="1400" dirty="0"/>
+              <a:t>Select “System”</a:t>
+            </a:r>
+          </a:p>
+          <a:p>
+            <a:pPr lvl="1"/>
+            <a:endParaRPr lang="en-GB" sz="1400" dirty="0"/>
+          </a:p>
+          <a:p>
+            <a:r>
+              <a:rPr lang="en-GB" sz="1800" dirty="0"/>
+              <a:t>1) Go to Python Website</a:t>
+            </a:r>
+          </a:p>
+          <a:p>
+            <a:pPr lvl="1"/>
+            <a:r>
+              <a:rPr lang="en-GB" sz="1400" dirty="0"/>
+              <a:t>Open a web browser</a:t>
+            </a:r>
+          </a:p>
+          <a:p>
+            <a:pPr lvl="1"/>
+            <a:r>
+              <a:rPr lang="en-GB" sz="1400" dirty="0"/>
+              <a:t>Enter </a:t>
+            </a:r>
+            <a:r>
+              <a:rPr lang="en-GB" sz="1400" dirty="0">
+                <a:hlinkClick r:id="rId2"/>
+              </a:rPr>
+              <a:t>https://www.python.org</a:t>
+            </a:r>
+            <a:endParaRPr lang="en-GB" sz="1400" dirty="0"/>
+          </a:p>
+          <a:p>
+            <a:pPr lvl="1"/>
+            <a:r>
+              <a:rPr lang="en-GB" sz="1400" dirty="0"/>
+              <a:t>Click “Downloads” to open Downloads page</a:t>
+            </a:r>
+          </a:p>
+          <a:p>
+            <a:pPr marL="457200" lvl="1" indent="0">
+              <a:buNone/>
+            </a:pPr>
+            <a:endParaRPr lang="en-GB" sz="1400" dirty="0"/>
+          </a:p>
+          <a:p>
+            <a:r>
+              <a:rPr lang="en-GB" sz="1800" dirty="0"/>
+              <a:t>2) Download Python</a:t>
+            </a:r>
+          </a:p>
+          <a:p>
+            <a:pPr lvl="1"/>
+            <a:r>
+              <a:rPr lang="en-GB" sz="1400" dirty="0"/>
+              <a:t>Click latest version starting with 3</a:t>
+            </a:r>
+          </a:p>
+          <a:p>
+            <a:pPr lvl="1"/>
+            <a:r>
+              <a:rPr lang="en-GB" sz="1400" dirty="0"/>
+              <a:t>Installer file will download automatically</a:t>
+            </a:r>
+          </a:p>
+          <a:p>
+            <a:pPr lvl="1"/>
+            <a:r>
+              <a:rPr lang="en-GB" sz="1400" dirty="0"/>
+              <a:t>Select “executable installer” from installer options</a:t>
+            </a:r>
           </a:p>
         </p:txBody>
       </p:sp>
@@ -3891,12 +4186,138 @@
             <p:ph sz="half" idx="2"/>
           </p:nvPr>
         </p:nvSpPr>
-        <p:spPr/>
-        <p:txBody>
-          <a:bodyPr/>
-          <a:lstStyle/>
-          <a:p>
-            <a:endParaRPr lang="en-GB"/>
+        <p:spPr>
+          <a:xfrm>
+            <a:off x="6172200" y="1825624"/>
+            <a:ext cx="5181600" cy="4826845"/>
+          </a:xfrm>
+        </p:spPr>
+        <p:txBody>
+          <a:bodyPr>
+            <a:normAutofit/>
+          </a:bodyPr>
+          <a:lstStyle/>
+          <a:p>
+            <a:r>
+              <a:rPr lang="en-GB" sz="1800" dirty="0"/>
+              <a:t>3) Run the installer</a:t>
+            </a:r>
+          </a:p>
+          <a:p>
+            <a:pPr lvl="1"/>
+            <a:r>
+              <a:rPr lang="en-GB" sz="1400" dirty="0"/>
+              <a:t>Double-click installer file to install Python</a:t>
+            </a:r>
+          </a:p>
+          <a:p>
+            <a:pPr lvl="1"/>
+            <a:r>
+              <a:rPr lang="en-GB" sz="1400" dirty="0"/>
+              <a:t>Choose “install for all users”</a:t>
+            </a:r>
+          </a:p>
+          <a:p>
+            <a:pPr lvl="1"/>
+            <a:r>
+              <a:rPr lang="en-GB" sz="1400" dirty="0"/>
+              <a:t>Click “next” at each prompt - keep default</a:t>
+            </a:r>
+          </a:p>
+          <a:p>
+            <a:pPr marL="457200" lvl="1" indent="0">
+              <a:buNone/>
+            </a:pPr>
+            <a:endParaRPr lang="en-GB" sz="1400" dirty="0"/>
+          </a:p>
+          <a:p>
+            <a:r>
+              <a:rPr lang="en-GB" sz="1800" dirty="0"/>
+              <a:t>4) Check Python is installed</a:t>
+            </a:r>
+          </a:p>
+          <a:p>
+            <a:pPr lvl="1"/>
+            <a:r>
+              <a:rPr lang="en-GB" sz="1400" dirty="0"/>
+              <a:t>Click “Start”</a:t>
+            </a:r>
+          </a:p>
+          <a:p>
+            <a:pPr lvl="1"/>
+            <a:r>
+              <a:rPr lang="en-GB" sz="1400" dirty="0"/>
+              <a:t>Type “cmd” - hit enter</a:t>
+            </a:r>
+          </a:p>
+          <a:p>
+            <a:pPr lvl="1"/>
+            <a:r>
+              <a:rPr lang="en-GB" sz="1400" dirty="0"/>
+              <a:t>Type “python” - hit enter</a:t>
+            </a:r>
+          </a:p>
+          <a:p>
+            <a:pPr lvl="1"/>
+            <a:r>
+              <a:rPr lang="en-GB" sz="1400" dirty="0"/>
+              <a:t>If exists will display - else be an error I tell </a:t>
+            </a:r>
+            <a:r>
+              <a:rPr lang="en-GB" sz="1400" dirty="0" err="1"/>
+              <a:t>ya</a:t>
+            </a:r>
+            <a:endParaRPr lang="en-GB" sz="1400" dirty="0"/>
+          </a:p>
+          <a:p>
+            <a:pPr marL="457200" lvl="1" indent="0">
+              <a:buNone/>
+            </a:pPr>
+            <a:endParaRPr lang="en-GB" sz="1400" dirty="0"/>
+          </a:p>
+          <a:p>
+            <a:r>
+              <a:rPr lang="en-GB" sz="1800" dirty="0"/>
+              <a:t>5) Open IDLE</a:t>
+            </a:r>
+          </a:p>
+          <a:p>
+            <a:pPr lvl="1"/>
+            <a:r>
+              <a:rPr lang="en-GB" sz="1400" dirty="0"/>
+              <a:t>When installation finished open IDLE</a:t>
+            </a:r>
+          </a:p>
+          <a:p>
+            <a:pPr lvl="1"/>
+            <a:r>
+              <a:rPr lang="en-GB" sz="1400" dirty="0"/>
+              <a:t>Click “Start”</a:t>
+            </a:r>
+          </a:p>
+          <a:p>
+            <a:pPr lvl="1"/>
+            <a:r>
+              <a:rPr lang="en-GB" sz="1400" dirty="0"/>
+              <a:t>Click “All Apps”</a:t>
+            </a:r>
+          </a:p>
+          <a:p>
+            <a:pPr lvl="1"/>
+            <a:r>
+              <a:rPr lang="en-GB" sz="1400" dirty="0"/>
+              <a:t>Select “IDLE”</a:t>
+            </a:r>
+          </a:p>
+          <a:p>
+            <a:pPr lvl="1"/>
+            <a:r>
+              <a:rPr lang="en-GB" sz="1400" dirty="0"/>
+              <a:t>IDLE will open</a:t>
+            </a:r>
+          </a:p>
+          <a:p>
+            <a:endParaRPr lang="en-GB" sz="1800" dirty="0"/>
           </a:p>
         </p:txBody>
       </p:sp>
@@ -3946,7 +4367,12 @@
             <p:ph type="title"/>
           </p:nvPr>
         </p:nvSpPr>
-        <p:spPr/>
+        <p:spPr>
+          <a:xfrm>
+            <a:off x="838200" y="356562"/>
+            <a:ext cx="10515600" cy="1325563"/>
+          </a:xfrm>
+        </p:spPr>
         <p:txBody>
           <a:bodyPr/>
           <a:lstStyle/>
@@ -3960,10 +4386,149 @@
       </p:sp>
       <p:sp>
         <p:nvSpPr>
-          <p:cNvPr id="3" name="Content Placeholder 2">
-            <a:extLst>
-              <a:ext uri="{FF2B5EF4-FFF2-40B4-BE49-F238E27FC236}">
-                <a16:creationId xmlns:a16="http://schemas.microsoft.com/office/drawing/2014/main" id="{934AC105-B496-4EB2-B40F-B726874A5AE0}"/>
+          <p:cNvPr id="4" name="Content Placeholder 3">
+            <a:extLst>
+              <a:ext uri="{FF2B5EF4-FFF2-40B4-BE49-F238E27FC236}">
+                <a16:creationId xmlns:a16="http://schemas.microsoft.com/office/drawing/2014/main" id="{09A5C0A5-9F54-4959-86D4-CA4B40945B15}"/>
+              </a:ext>
+            </a:extLst>
+          </p:cNvPr>
+          <p:cNvSpPr>
+            <a:spLocks noGrp="1"/>
+          </p:cNvSpPr>
+          <p:nvPr>
+            <p:ph sz="half" idx="2"/>
+          </p:nvPr>
+        </p:nvSpPr>
+        <p:spPr/>
+        <p:txBody>
+          <a:bodyPr>
+            <a:normAutofit/>
+          </a:bodyPr>
+          <a:lstStyle/>
+          <a:p>
+            <a:r>
+              <a:rPr lang="en-GB" sz="1800" dirty="0"/>
+              <a:t>Extra tasks</a:t>
+            </a:r>
+          </a:p>
+          <a:p>
+            <a:pPr lvl="1"/>
+            <a:r>
+              <a:rPr lang="en-GB" sz="1400" dirty="0"/>
+              <a:t>Ask the user for their age</a:t>
+            </a:r>
+          </a:p>
+          <a:p>
+            <a:pPr lvl="1"/>
+            <a:r>
+              <a:rPr lang="en-GB" sz="1400" dirty="0"/>
+              <a:t>Output required “Hello, Johnny. You are 21 years old.”</a:t>
+            </a:r>
+          </a:p>
+          <a:p>
+            <a:pPr lvl="1"/>
+            <a:endParaRPr lang="en-GB" sz="1400" dirty="0"/>
+          </a:p>
+          <a:p>
+            <a:pPr lvl="1"/>
+            <a:r>
+              <a:rPr lang="en-GB" sz="1400" dirty="0"/>
+              <a:t>Ask the user for their address</a:t>
+            </a:r>
+          </a:p>
+          <a:p>
+            <a:pPr lvl="1"/>
+            <a:r>
+              <a:rPr lang="en-GB" sz="1400" dirty="0"/>
+              <a:t>Output required “Hello, Johnny. Your address is: ”</a:t>
+            </a:r>
+          </a:p>
+          <a:p>
+            <a:pPr lvl="1"/>
+            <a:endParaRPr lang="en-GB" sz="1400" dirty="0"/>
+          </a:p>
+          <a:p>
+            <a:pPr lvl="1"/>
+            <a:r>
+              <a:rPr lang="en-GB" sz="1400" dirty="0"/>
+              <a:t>Ask the user for their phone number</a:t>
+            </a:r>
+          </a:p>
+          <a:p>
+            <a:pPr lvl="1"/>
+            <a:r>
+              <a:rPr lang="en-GB" sz="1400" dirty="0"/>
+              <a:t>Output required “Hello, Johnny. Your mobile no is: ”</a:t>
+            </a:r>
+          </a:p>
+        </p:txBody>
+      </p:sp>
+      <p:sp>
+        <p:nvSpPr>
+          <p:cNvPr id="6" name="Rectangle: Rounded Corners 5">
+            <a:extLst>
+              <a:ext uri="{FF2B5EF4-FFF2-40B4-BE49-F238E27FC236}">
+                <a16:creationId xmlns:a16="http://schemas.microsoft.com/office/drawing/2014/main" id="{C79E80B3-2809-467F-AB13-B52259023B8F}"/>
+              </a:ext>
+            </a:extLst>
+          </p:cNvPr>
+          <p:cNvSpPr/>
+          <p:nvPr/>
+        </p:nvSpPr>
+        <p:spPr>
+          <a:xfrm>
+            <a:off x="2246152" y="1968238"/>
+            <a:ext cx="1738618" cy="369332"/>
+          </a:xfrm>
+          <a:prstGeom prst="roundRect">
+            <a:avLst/>
+          </a:prstGeom>
+          <a:solidFill>
+            <a:schemeClr val="accent1">
+              <a:lumMod val="40000"/>
+              <a:lumOff val="60000"/>
+            </a:schemeClr>
+          </a:solidFill>
+        </p:spPr>
+        <p:style>
+          <a:lnRef idx="2">
+            <a:schemeClr val="accent1">
+              <a:shade val="50000"/>
+            </a:schemeClr>
+          </a:lnRef>
+          <a:fillRef idx="1">
+            <a:schemeClr val="accent1"/>
+          </a:fillRef>
+          <a:effectRef idx="0">
+            <a:schemeClr val="accent1"/>
+          </a:effectRef>
+          <a:fontRef idx="minor">
+            <a:schemeClr val="lt1"/>
+          </a:fontRef>
+        </p:style>
+        <p:txBody>
+          <a:bodyPr rtlCol="0" anchor="ctr"/>
+          <a:lstStyle/>
+          <a:p>
+            <a:pPr algn="ctr"/>
+            <a:r>
+              <a:rPr lang="en-GB" dirty="0">
+                <a:solidFill>
+                  <a:schemeClr val="tx1"/>
+                </a:solidFill>
+              </a:rPr>
+              <a:t>Start</a:t>
+            </a:r>
+          </a:p>
+        </p:txBody>
+      </p:sp>
+      <p:sp>
+        <p:nvSpPr>
+          <p:cNvPr id="7" name="Content Placeholder 6">
+            <a:extLst>
+              <a:ext uri="{FF2B5EF4-FFF2-40B4-BE49-F238E27FC236}">
+                <a16:creationId xmlns:a16="http://schemas.microsoft.com/office/drawing/2014/main" id="{727CC021-A1D3-4BBE-BB06-E973D7ED932D}"/>
               </a:ext>
             </a:extLst>
           </p:cNvPr>
@@ -3974,36 +4539,412 @@
             <p:ph sz="half" idx="1"/>
           </p:nvPr>
         </p:nvSpPr>
-        <p:spPr/>
-        <p:txBody>
-          <a:bodyPr/>
-          <a:lstStyle/>
-          <a:p>
-            <a:endParaRPr lang="en-GB"/>
-          </a:p>
-        </p:txBody>
-      </p:sp>
-      <p:sp>
-        <p:nvSpPr>
-          <p:cNvPr id="4" name="Content Placeholder 3">
-            <a:extLst>
-              <a:ext uri="{FF2B5EF4-FFF2-40B4-BE49-F238E27FC236}">
-                <a16:creationId xmlns:a16="http://schemas.microsoft.com/office/drawing/2014/main" id="{09A5C0A5-9F54-4959-86D4-CA4B40945B15}"/>
-              </a:ext>
-            </a:extLst>
-          </p:cNvPr>
-          <p:cNvSpPr>
-            <a:spLocks noGrp="1"/>
-          </p:cNvSpPr>
-          <p:nvPr>
-            <p:ph sz="half" idx="2"/>
-          </p:nvPr>
-        </p:nvSpPr>
-        <p:spPr/>
-        <p:txBody>
-          <a:bodyPr/>
-          <a:lstStyle/>
-          <a:p>
+        <p:spPr>
+          <a:xfrm>
+            <a:off x="2251744" y="2648691"/>
+            <a:ext cx="1733026" cy="369332"/>
+          </a:xfrm>
+          <a:prstGeom prst="roundRect">
+            <a:avLst/>
+          </a:prstGeom>
+          <a:solidFill>
+            <a:schemeClr val="accent4">
+              <a:lumMod val="40000"/>
+              <a:lumOff val="60000"/>
+            </a:schemeClr>
+          </a:solidFill>
+        </p:spPr>
+        <p:style>
+          <a:lnRef idx="2">
+            <a:schemeClr val="accent1">
+              <a:shade val="50000"/>
+            </a:schemeClr>
+          </a:lnRef>
+          <a:fillRef idx="1">
+            <a:schemeClr val="accent1"/>
+          </a:fillRef>
+          <a:effectRef idx="0">
+            <a:schemeClr val="accent1"/>
+          </a:effectRef>
+          <a:fontRef idx="minor">
+            <a:schemeClr val="lt1"/>
+          </a:fontRef>
+        </p:style>
+        <p:txBody>
+          <a:bodyPr rtlCol="0" anchor="ctr"/>
+          <a:lstStyle/>
+          <a:p>
+            <a:pPr marL="0" indent="0" algn="ctr">
+              <a:buNone/>
+            </a:pPr>
+            <a:r>
+              <a:rPr lang="en-GB" sz="1800" dirty="0">
+                <a:solidFill>
+                  <a:schemeClr val="tx1"/>
+                </a:solidFill>
+              </a:rPr>
+              <a:t>Say hello</a:t>
+            </a:r>
+          </a:p>
+        </p:txBody>
+      </p:sp>
+      <p:sp>
+        <p:nvSpPr>
+          <p:cNvPr id="8" name="Rectangle: Rounded Corners 7">
+            <a:extLst>
+              <a:ext uri="{FF2B5EF4-FFF2-40B4-BE49-F238E27FC236}">
+                <a16:creationId xmlns:a16="http://schemas.microsoft.com/office/drawing/2014/main" id="{214EA30D-38A7-4255-8534-8FF03119D43E}"/>
+              </a:ext>
+            </a:extLst>
+          </p:cNvPr>
+          <p:cNvSpPr/>
+          <p:nvPr/>
+        </p:nvSpPr>
+        <p:spPr>
+          <a:xfrm>
+            <a:off x="2246152" y="3326511"/>
+            <a:ext cx="1738618" cy="554548"/>
+          </a:xfrm>
+          <a:prstGeom prst="roundRect">
+            <a:avLst/>
+          </a:prstGeom>
+          <a:solidFill>
+            <a:schemeClr val="accent4">
+              <a:lumMod val="40000"/>
+              <a:lumOff val="60000"/>
+            </a:schemeClr>
+          </a:solidFill>
+        </p:spPr>
+        <p:style>
+          <a:lnRef idx="2">
+            <a:schemeClr val="accent1">
+              <a:shade val="50000"/>
+            </a:schemeClr>
+          </a:lnRef>
+          <a:fillRef idx="1">
+            <a:schemeClr val="accent1"/>
+          </a:fillRef>
+          <a:effectRef idx="0">
+            <a:schemeClr val="accent1"/>
+          </a:effectRef>
+          <a:fontRef idx="minor">
+            <a:schemeClr val="lt1"/>
+          </a:fontRef>
+        </p:style>
+        <p:txBody>
+          <a:bodyPr rtlCol="0" anchor="ctr"/>
+          <a:lstStyle/>
+          <a:p>
+            <a:pPr algn="ctr"/>
+            <a:r>
+              <a:rPr lang="en-GB" dirty="0">
+                <a:solidFill>
+                  <a:schemeClr val="tx1"/>
+                </a:solidFill>
+              </a:rPr>
+              <a:t>Ask user to type their name</a:t>
+            </a:r>
+          </a:p>
+        </p:txBody>
+      </p:sp>
+      <p:sp>
+        <p:nvSpPr>
+          <p:cNvPr id="9" name="Rectangle: Rounded Corners 8">
+            <a:extLst>
+              <a:ext uri="{FF2B5EF4-FFF2-40B4-BE49-F238E27FC236}">
+                <a16:creationId xmlns:a16="http://schemas.microsoft.com/office/drawing/2014/main" id="{FF2E8E20-308F-48F6-A820-57711F42DE3E}"/>
+              </a:ext>
+            </a:extLst>
+          </p:cNvPr>
+          <p:cNvSpPr/>
+          <p:nvPr/>
+        </p:nvSpPr>
+        <p:spPr>
+          <a:xfrm>
+            <a:off x="2246152" y="4203403"/>
+            <a:ext cx="1738618" cy="869947"/>
+          </a:xfrm>
+          <a:prstGeom prst="roundRect">
+            <a:avLst/>
+          </a:prstGeom>
+          <a:solidFill>
+            <a:schemeClr val="accent4">
+              <a:lumMod val="40000"/>
+              <a:lumOff val="60000"/>
+            </a:schemeClr>
+          </a:solidFill>
+        </p:spPr>
+        <p:style>
+          <a:lnRef idx="2">
+            <a:schemeClr val="accent1">
+              <a:shade val="50000"/>
+            </a:schemeClr>
+          </a:lnRef>
+          <a:fillRef idx="1">
+            <a:schemeClr val="accent1"/>
+          </a:fillRef>
+          <a:effectRef idx="0">
+            <a:schemeClr val="accent1"/>
+          </a:effectRef>
+          <a:fontRef idx="minor">
+            <a:schemeClr val="lt1"/>
+          </a:fontRef>
+        </p:style>
+        <p:txBody>
+          <a:bodyPr rtlCol="0" anchor="ctr"/>
+          <a:lstStyle/>
+          <a:p>
+            <a:pPr algn="ctr"/>
+            <a:r>
+              <a:rPr lang="en-GB" dirty="0">
+                <a:solidFill>
+                  <a:schemeClr val="tx1"/>
+                </a:solidFill>
+              </a:rPr>
+              <a:t>Say hello, adding user’s name</a:t>
+            </a:r>
+          </a:p>
+        </p:txBody>
+      </p:sp>
+      <p:sp>
+        <p:nvSpPr>
+          <p:cNvPr id="10" name="Rectangle: Rounded Corners 9">
+            <a:extLst>
+              <a:ext uri="{FF2B5EF4-FFF2-40B4-BE49-F238E27FC236}">
+                <a16:creationId xmlns:a16="http://schemas.microsoft.com/office/drawing/2014/main" id="{F236CEB2-6E4E-41FC-82FB-3A62D1EA48D8}"/>
+              </a:ext>
+            </a:extLst>
+          </p:cNvPr>
+          <p:cNvSpPr/>
+          <p:nvPr/>
+        </p:nvSpPr>
+        <p:spPr>
+          <a:xfrm>
+            <a:off x="2246152" y="5389754"/>
+            <a:ext cx="1738618" cy="369332"/>
+          </a:xfrm>
+          <a:prstGeom prst="roundRect">
+            <a:avLst/>
+          </a:prstGeom>
+          <a:solidFill>
+            <a:schemeClr val="accent1">
+              <a:lumMod val="40000"/>
+              <a:lumOff val="60000"/>
+            </a:schemeClr>
+          </a:solidFill>
+        </p:spPr>
+        <p:style>
+          <a:lnRef idx="2">
+            <a:schemeClr val="accent1">
+              <a:shade val="50000"/>
+            </a:schemeClr>
+          </a:lnRef>
+          <a:fillRef idx="1">
+            <a:schemeClr val="accent1"/>
+          </a:fillRef>
+          <a:effectRef idx="0">
+            <a:schemeClr val="accent1"/>
+          </a:effectRef>
+          <a:fontRef idx="minor">
+            <a:schemeClr val="lt1"/>
+          </a:fontRef>
+        </p:style>
+        <p:txBody>
+          <a:bodyPr rtlCol="0" anchor="ctr"/>
+          <a:lstStyle/>
+          <a:p>
+            <a:pPr algn="ctr"/>
+            <a:r>
+              <a:rPr lang="en-GB" dirty="0">
+                <a:solidFill>
+                  <a:schemeClr val="tx1"/>
+                </a:solidFill>
+              </a:rPr>
+              <a:t>End</a:t>
+            </a:r>
+          </a:p>
+        </p:txBody>
+      </p:sp>
+      <p:sp>
+        <p:nvSpPr>
+          <p:cNvPr id="11" name="Arrow: Down 10">
+            <a:extLst>
+              <a:ext uri="{FF2B5EF4-FFF2-40B4-BE49-F238E27FC236}">
+                <a16:creationId xmlns:a16="http://schemas.microsoft.com/office/drawing/2014/main" id="{DD136F3A-5D82-4F44-B156-7D941BBF8773}"/>
+              </a:ext>
+            </a:extLst>
+          </p:cNvPr>
+          <p:cNvSpPr/>
+          <p:nvPr/>
+        </p:nvSpPr>
+        <p:spPr>
+          <a:xfrm>
+            <a:off x="2986479" y="2385626"/>
+            <a:ext cx="269665" cy="215009"/>
+          </a:xfrm>
+          <a:prstGeom prst="downArrow">
+            <a:avLst/>
+          </a:prstGeom>
+        </p:spPr>
+        <p:style>
+          <a:lnRef idx="2">
+            <a:schemeClr val="accent1">
+              <a:shade val="50000"/>
+            </a:schemeClr>
+          </a:lnRef>
+          <a:fillRef idx="1">
+            <a:schemeClr val="accent1"/>
+          </a:fillRef>
+          <a:effectRef idx="0">
+            <a:schemeClr val="accent1"/>
+          </a:effectRef>
+          <a:fontRef idx="minor">
+            <a:schemeClr val="lt1"/>
+          </a:fontRef>
+        </p:style>
+        <p:txBody>
+          <a:bodyPr rtlCol="0" anchor="ctr"/>
+          <a:lstStyle/>
+          <a:p>
+            <a:pPr algn="ctr"/>
+            <a:endParaRPr lang="en-GB"/>
+          </a:p>
+        </p:txBody>
+      </p:sp>
+      <p:sp>
+        <p:nvSpPr>
+          <p:cNvPr id="12" name="Arrow: Down 11">
+            <a:extLst>
+              <a:ext uri="{FF2B5EF4-FFF2-40B4-BE49-F238E27FC236}">
+                <a16:creationId xmlns:a16="http://schemas.microsoft.com/office/drawing/2014/main" id="{43DF8798-DBF7-4862-9088-C4D8F0875625}"/>
+              </a:ext>
+            </a:extLst>
+          </p:cNvPr>
+          <p:cNvSpPr/>
+          <p:nvPr/>
+        </p:nvSpPr>
+        <p:spPr>
+          <a:xfrm>
+            <a:off x="2980628" y="3057834"/>
+            <a:ext cx="269665" cy="215009"/>
+          </a:xfrm>
+          <a:prstGeom prst="downArrow">
+            <a:avLst/>
+          </a:prstGeom>
+        </p:spPr>
+        <p:style>
+          <a:lnRef idx="2">
+            <a:schemeClr val="accent1">
+              <a:shade val="50000"/>
+            </a:schemeClr>
+          </a:lnRef>
+          <a:fillRef idx="1">
+            <a:schemeClr val="accent1"/>
+          </a:fillRef>
+          <a:effectRef idx="0">
+            <a:schemeClr val="accent1"/>
+          </a:effectRef>
+          <a:fontRef idx="minor">
+            <a:schemeClr val="lt1"/>
+          </a:fontRef>
+        </p:style>
+        <p:txBody>
+          <a:bodyPr rtlCol="0" anchor="ctr"/>
+          <a:lstStyle/>
+          <a:p>
+            <a:pPr algn="ctr"/>
+            <a:endParaRPr lang="en-GB"/>
+          </a:p>
+        </p:txBody>
+      </p:sp>
+      <p:sp>
+        <p:nvSpPr>
+          <p:cNvPr id="13" name="Arrow: Down 12">
+            <a:extLst>
+              <a:ext uri="{FF2B5EF4-FFF2-40B4-BE49-F238E27FC236}">
+                <a16:creationId xmlns:a16="http://schemas.microsoft.com/office/drawing/2014/main" id="{49A950F0-938F-4346-9359-0A91BAA5879E}"/>
+              </a:ext>
+            </a:extLst>
+          </p:cNvPr>
+          <p:cNvSpPr/>
+          <p:nvPr/>
+        </p:nvSpPr>
+        <p:spPr>
+          <a:xfrm>
+            <a:off x="2980627" y="5127019"/>
+            <a:ext cx="269665" cy="215009"/>
+          </a:xfrm>
+          <a:prstGeom prst="downArrow">
+            <a:avLst/>
+          </a:prstGeom>
+        </p:spPr>
+        <p:style>
+          <a:lnRef idx="2">
+            <a:schemeClr val="accent1">
+              <a:shade val="50000"/>
+            </a:schemeClr>
+          </a:lnRef>
+          <a:fillRef idx="1">
+            <a:schemeClr val="accent1"/>
+          </a:fillRef>
+          <a:effectRef idx="0">
+            <a:schemeClr val="accent1"/>
+          </a:effectRef>
+          <a:fontRef idx="minor">
+            <a:schemeClr val="lt1"/>
+          </a:fontRef>
+        </p:style>
+        <p:txBody>
+          <a:bodyPr rtlCol="0" anchor="ctr"/>
+          <a:lstStyle/>
+          <a:p>
+            <a:pPr algn="ctr"/>
+            <a:endParaRPr lang="en-GB"/>
+          </a:p>
+        </p:txBody>
+      </p:sp>
+      <p:sp>
+        <p:nvSpPr>
+          <p:cNvPr id="14" name="Arrow: Down 13">
+            <a:extLst>
+              <a:ext uri="{FF2B5EF4-FFF2-40B4-BE49-F238E27FC236}">
+                <a16:creationId xmlns:a16="http://schemas.microsoft.com/office/drawing/2014/main" id="{26BCC0CB-6608-44B5-A2E2-1609DDD14C0B}"/>
+              </a:ext>
+            </a:extLst>
+          </p:cNvPr>
+          <p:cNvSpPr/>
+          <p:nvPr/>
+        </p:nvSpPr>
+        <p:spPr>
+          <a:xfrm>
+            <a:off x="2980628" y="3934727"/>
+            <a:ext cx="269665" cy="215009"/>
+          </a:xfrm>
+          <a:prstGeom prst="downArrow">
+            <a:avLst/>
+          </a:prstGeom>
+        </p:spPr>
+        <p:style>
+          <a:lnRef idx="2">
+            <a:schemeClr val="accent1">
+              <a:shade val="50000"/>
+            </a:schemeClr>
+          </a:lnRef>
+          <a:fillRef idx="1">
+            <a:schemeClr val="accent1"/>
+          </a:fillRef>
+          <a:effectRef idx="0">
+            <a:schemeClr val="accent1"/>
+          </a:effectRef>
+          <a:fontRef idx="minor">
+            <a:schemeClr val="lt1"/>
+          </a:fontRef>
+        </p:style>
+        <p:txBody>
+          <a:bodyPr rtlCol="0" anchor="ctr"/>
+          <a:lstStyle/>
+          <a:p>
+            <a:pPr algn="ctr"/>
             <a:endParaRPr lang="en-GB"/>
           </a:p>
         </p:txBody>

</xml_diff>